<commit_message>
unify naming of amb and air
</commit_message>
<xml_diff>
--- a/docs/fig/source_files/221021_STES_layer.pptx
+++ b/docs/fig/source_files/221021_STES_layer.pptx
@@ -104,6 +104,11 @@
       </a:defRPr>
     </a:lvl9pPr>
   </p:defaultTextStyle>
+  <p:extLst>
+    <p:ext uri="{EFAFB233-063F-42B5-8137-9DF3F51BA10A}">
+      <p15:sldGuideLst xmlns:p15="http://schemas.microsoft.com/office/powerpoint/2012/main"/>
+    </p:ext>
+  </p:extLst>
 </p:presentation>
 </file>
 
@@ -149,10 +154,9 @@
           </a:lstStyle>
           <a:p>
             <a:r>
-              <a:rPr lang="de-DE" smtClean="0"/>
+              <a:rPr lang="de-DE"/>
               <a:t>Titelmasterformat durch Klicken bearbeiten</a:t>
             </a:r>
-            <a:endParaRPr lang="de-DE"/>
           </a:p>
         </p:txBody>
       </p:sp>
@@ -214,10 +218,9 @@
           </a:lstStyle>
           <a:p>
             <a:r>
-              <a:rPr lang="de-DE" smtClean="0"/>
+              <a:rPr lang="de-DE"/>
               <a:t>Formatvorlage des Untertitelmasters durch Klicken bearbeiten</a:t>
             </a:r>
-            <a:endParaRPr lang="de-DE"/>
           </a:p>
         </p:txBody>
       </p:sp>
@@ -238,7 +241,7 @@
           <a:p>
             <a:fld id="{DD31F514-E035-4045-BF8B-8CA1E5BC6F1B}" type="datetimeFigureOut">
               <a:rPr lang="de-DE" smtClean="0"/>
-              <a:t>21.10.2022</a:t>
+              <a:t>04.02.2026</a:t>
             </a:fld>
             <a:endParaRPr lang="de-DE"/>
           </a:p>
@@ -332,10 +335,9 @@
           <a:lstStyle/>
           <a:p>
             <a:r>
-              <a:rPr lang="de-DE" smtClean="0"/>
+              <a:rPr lang="de-DE"/>
               <a:t>Titelmasterformat durch Klicken bearbeiten</a:t>
             </a:r>
-            <a:endParaRPr lang="de-DE"/>
           </a:p>
         </p:txBody>
       </p:sp>
@@ -356,38 +358,37 @@
           <a:p>
             <a:pPr lvl="0"/>
             <a:r>
-              <a:rPr lang="de-DE" smtClean="0"/>
+              <a:rPr lang="de-DE"/>
               <a:t>Formatvorlagen des Textmasters bearbeiten</a:t>
             </a:r>
           </a:p>
           <a:p>
             <a:pPr lvl="1"/>
             <a:r>
-              <a:rPr lang="de-DE" smtClean="0"/>
+              <a:rPr lang="de-DE"/>
               <a:t>Zweite Ebene</a:t>
             </a:r>
           </a:p>
           <a:p>
             <a:pPr lvl="2"/>
             <a:r>
-              <a:rPr lang="de-DE" smtClean="0"/>
+              <a:rPr lang="de-DE"/>
               <a:t>Dritte Ebene</a:t>
             </a:r>
           </a:p>
           <a:p>
             <a:pPr lvl="3"/>
             <a:r>
-              <a:rPr lang="de-DE" smtClean="0"/>
+              <a:rPr lang="de-DE"/>
               <a:t>Vierte Ebene</a:t>
             </a:r>
           </a:p>
           <a:p>
             <a:pPr lvl="4"/>
             <a:r>
-              <a:rPr lang="de-DE" smtClean="0"/>
+              <a:rPr lang="de-DE"/>
               <a:t>Fünfte Ebene</a:t>
             </a:r>
-            <a:endParaRPr lang="de-DE"/>
           </a:p>
         </p:txBody>
       </p:sp>
@@ -408,7 +409,7 @@
           <a:p>
             <a:fld id="{DD31F514-E035-4045-BF8B-8CA1E5BC6F1B}" type="datetimeFigureOut">
               <a:rPr lang="de-DE" smtClean="0"/>
-              <a:t>21.10.2022</a:t>
+              <a:t>04.02.2026</a:t>
             </a:fld>
             <a:endParaRPr lang="de-DE"/>
           </a:p>
@@ -507,10 +508,9 @@
           <a:lstStyle/>
           <a:p>
             <a:r>
-              <a:rPr lang="de-DE" smtClean="0"/>
+              <a:rPr lang="de-DE"/>
               <a:t>Titelmasterformat durch Klicken bearbeiten</a:t>
             </a:r>
-            <a:endParaRPr lang="de-DE"/>
           </a:p>
         </p:txBody>
       </p:sp>
@@ -536,38 +536,37 @@
           <a:p>
             <a:pPr lvl="0"/>
             <a:r>
-              <a:rPr lang="de-DE" smtClean="0"/>
+              <a:rPr lang="de-DE"/>
               <a:t>Formatvorlagen des Textmasters bearbeiten</a:t>
             </a:r>
           </a:p>
           <a:p>
             <a:pPr lvl="1"/>
             <a:r>
-              <a:rPr lang="de-DE" smtClean="0"/>
+              <a:rPr lang="de-DE"/>
               <a:t>Zweite Ebene</a:t>
             </a:r>
           </a:p>
           <a:p>
             <a:pPr lvl="2"/>
             <a:r>
-              <a:rPr lang="de-DE" smtClean="0"/>
+              <a:rPr lang="de-DE"/>
               <a:t>Dritte Ebene</a:t>
             </a:r>
           </a:p>
           <a:p>
             <a:pPr lvl="3"/>
             <a:r>
-              <a:rPr lang="de-DE" smtClean="0"/>
+              <a:rPr lang="de-DE"/>
               <a:t>Vierte Ebene</a:t>
             </a:r>
           </a:p>
           <a:p>
             <a:pPr lvl="4"/>
             <a:r>
-              <a:rPr lang="de-DE" smtClean="0"/>
+              <a:rPr lang="de-DE"/>
               <a:t>Fünfte Ebene</a:t>
             </a:r>
-            <a:endParaRPr lang="de-DE"/>
           </a:p>
         </p:txBody>
       </p:sp>
@@ -588,7 +587,7 @@
           <a:p>
             <a:fld id="{DD31F514-E035-4045-BF8B-8CA1E5BC6F1B}" type="datetimeFigureOut">
               <a:rPr lang="de-DE" smtClean="0"/>
-              <a:t>21.10.2022</a:t>
+              <a:t>04.02.2026</a:t>
             </a:fld>
             <a:endParaRPr lang="de-DE"/>
           </a:p>
@@ -682,10 +681,9 @@
           <a:lstStyle/>
           <a:p>
             <a:r>
-              <a:rPr lang="de-DE" smtClean="0"/>
+              <a:rPr lang="de-DE"/>
               <a:t>Titelmasterformat durch Klicken bearbeiten</a:t>
             </a:r>
-            <a:endParaRPr lang="de-DE"/>
           </a:p>
         </p:txBody>
       </p:sp>
@@ -706,38 +704,37 @@
           <a:p>
             <a:pPr lvl="0"/>
             <a:r>
-              <a:rPr lang="de-DE" smtClean="0"/>
+              <a:rPr lang="de-DE"/>
               <a:t>Formatvorlagen des Textmasters bearbeiten</a:t>
             </a:r>
           </a:p>
           <a:p>
             <a:pPr lvl="1"/>
             <a:r>
-              <a:rPr lang="de-DE" smtClean="0"/>
+              <a:rPr lang="de-DE"/>
               <a:t>Zweite Ebene</a:t>
             </a:r>
           </a:p>
           <a:p>
             <a:pPr lvl="2"/>
             <a:r>
-              <a:rPr lang="de-DE" smtClean="0"/>
+              <a:rPr lang="de-DE"/>
               <a:t>Dritte Ebene</a:t>
             </a:r>
           </a:p>
           <a:p>
             <a:pPr lvl="3"/>
             <a:r>
-              <a:rPr lang="de-DE" smtClean="0"/>
+              <a:rPr lang="de-DE"/>
               <a:t>Vierte Ebene</a:t>
             </a:r>
           </a:p>
           <a:p>
             <a:pPr lvl="4"/>
             <a:r>
-              <a:rPr lang="de-DE" smtClean="0"/>
+              <a:rPr lang="de-DE"/>
               <a:t>Fünfte Ebene</a:t>
             </a:r>
-            <a:endParaRPr lang="de-DE"/>
           </a:p>
         </p:txBody>
       </p:sp>
@@ -758,7 +755,7 @@
           <a:p>
             <a:fld id="{DD31F514-E035-4045-BF8B-8CA1E5BC6F1B}" type="datetimeFigureOut">
               <a:rPr lang="de-DE" smtClean="0"/>
-              <a:t>21.10.2022</a:t>
+              <a:t>04.02.2026</a:t>
             </a:fld>
             <a:endParaRPr lang="de-DE"/>
           </a:p>
@@ -861,10 +858,9 @@
           </a:lstStyle>
           <a:p>
             <a:r>
-              <a:rPr lang="de-DE" smtClean="0"/>
+              <a:rPr lang="de-DE"/>
               <a:t>Titelmasterformat durch Klicken bearbeiten</a:t>
             </a:r>
-            <a:endParaRPr lang="de-DE"/>
           </a:p>
         </p:txBody>
       </p:sp>
@@ -981,7 +977,7 @@
           <a:p>
             <a:pPr lvl="0"/>
             <a:r>
-              <a:rPr lang="de-DE" smtClean="0"/>
+              <a:rPr lang="de-DE"/>
               <a:t>Formatvorlagen des Textmasters bearbeiten</a:t>
             </a:r>
           </a:p>
@@ -1004,7 +1000,7 @@
           <a:p>
             <a:fld id="{DD31F514-E035-4045-BF8B-8CA1E5BC6F1B}" type="datetimeFigureOut">
               <a:rPr lang="de-DE" smtClean="0"/>
-              <a:t>21.10.2022</a:t>
+              <a:t>04.02.2026</a:t>
             </a:fld>
             <a:endParaRPr lang="de-DE"/>
           </a:p>
@@ -1098,10 +1094,9 @@
           <a:lstStyle/>
           <a:p>
             <a:r>
-              <a:rPr lang="de-DE" smtClean="0"/>
+              <a:rPr lang="de-DE"/>
               <a:t>Titelmasterformat durch Klicken bearbeiten</a:t>
             </a:r>
-            <a:endParaRPr lang="de-DE"/>
           </a:p>
         </p:txBody>
       </p:sp>
@@ -1127,38 +1122,37 @@
           <a:p>
             <a:pPr lvl="0"/>
             <a:r>
-              <a:rPr lang="de-DE" smtClean="0"/>
+              <a:rPr lang="de-DE"/>
               <a:t>Formatvorlagen des Textmasters bearbeiten</a:t>
             </a:r>
           </a:p>
           <a:p>
             <a:pPr lvl="1"/>
             <a:r>
-              <a:rPr lang="de-DE" smtClean="0"/>
+              <a:rPr lang="de-DE"/>
               <a:t>Zweite Ebene</a:t>
             </a:r>
           </a:p>
           <a:p>
             <a:pPr lvl="2"/>
             <a:r>
-              <a:rPr lang="de-DE" smtClean="0"/>
+              <a:rPr lang="de-DE"/>
               <a:t>Dritte Ebene</a:t>
             </a:r>
           </a:p>
           <a:p>
             <a:pPr lvl="3"/>
             <a:r>
-              <a:rPr lang="de-DE" smtClean="0"/>
+              <a:rPr lang="de-DE"/>
               <a:t>Vierte Ebene</a:t>
             </a:r>
           </a:p>
           <a:p>
             <a:pPr lvl="4"/>
             <a:r>
-              <a:rPr lang="de-DE" smtClean="0"/>
+              <a:rPr lang="de-DE"/>
               <a:t>Fünfte Ebene</a:t>
             </a:r>
-            <a:endParaRPr lang="de-DE"/>
           </a:p>
         </p:txBody>
       </p:sp>
@@ -1184,38 +1178,37 @@
           <a:p>
             <a:pPr lvl="0"/>
             <a:r>
-              <a:rPr lang="de-DE" smtClean="0"/>
+              <a:rPr lang="de-DE"/>
               <a:t>Formatvorlagen des Textmasters bearbeiten</a:t>
             </a:r>
           </a:p>
           <a:p>
             <a:pPr lvl="1"/>
             <a:r>
-              <a:rPr lang="de-DE" smtClean="0"/>
+              <a:rPr lang="de-DE"/>
               <a:t>Zweite Ebene</a:t>
             </a:r>
           </a:p>
           <a:p>
             <a:pPr lvl="2"/>
             <a:r>
-              <a:rPr lang="de-DE" smtClean="0"/>
+              <a:rPr lang="de-DE"/>
               <a:t>Dritte Ebene</a:t>
             </a:r>
           </a:p>
           <a:p>
             <a:pPr lvl="3"/>
             <a:r>
-              <a:rPr lang="de-DE" smtClean="0"/>
+              <a:rPr lang="de-DE"/>
               <a:t>Vierte Ebene</a:t>
             </a:r>
           </a:p>
           <a:p>
             <a:pPr lvl="4"/>
             <a:r>
-              <a:rPr lang="de-DE" smtClean="0"/>
+              <a:rPr lang="de-DE"/>
               <a:t>Fünfte Ebene</a:t>
             </a:r>
-            <a:endParaRPr lang="de-DE"/>
           </a:p>
         </p:txBody>
       </p:sp>
@@ -1236,7 +1229,7 @@
           <a:p>
             <a:fld id="{DD31F514-E035-4045-BF8B-8CA1E5BC6F1B}" type="datetimeFigureOut">
               <a:rPr lang="de-DE" smtClean="0"/>
-              <a:t>21.10.2022</a:t>
+              <a:t>04.02.2026</a:t>
             </a:fld>
             <a:endParaRPr lang="de-DE"/>
           </a:p>
@@ -1335,10 +1328,9 @@
           <a:lstStyle/>
           <a:p>
             <a:r>
-              <a:rPr lang="de-DE" smtClean="0"/>
+              <a:rPr lang="de-DE"/>
               <a:t>Titelmasterformat durch Klicken bearbeiten</a:t>
             </a:r>
-            <a:endParaRPr lang="de-DE"/>
           </a:p>
         </p:txBody>
       </p:sp>
@@ -1401,7 +1393,7 @@
           <a:p>
             <a:pPr lvl="0"/>
             <a:r>
-              <a:rPr lang="de-DE" smtClean="0"/>
+              <a:rPr lang="de-DE"/>
               <a:t>Formatvorlagen des Textmasters bearbeiten</a:t>
             </a:r>
           </a:p>
@@ -1429,38 +1421,37 @@
           <a:p>
             <a:pPr lvl="0"/>
             <a:r>
-              <a:rPr lang="de-DE" smtClean="0"/>
+              <a:rPr lang="de-DE"/>
               <a:t>Formatvorlagen des Textmasters bearbeiten</a:t>
             </a:r>
           </a:p>
           <a:p>
             <a:pPr lvl="1"/>
             <a:r>
-              <a:rPr lang="de-DE" smtClean="0"/>
+              <a:rPr lang="de-DE"/>
               <a:t>Zweite Ebene</a:t>
             </a:r>
           </a:p>
           <a:p>
             <a:pPr lvl="2"/>
             <a:r>
-              <a:rPr lang="de-DE" smtClean="0"/>
+              <a:rPr lang="de-DE"/>
               <a:t>Dritte Ebene</a:t>
             </a:r>
           </a:p>
           <a:p>
             <a:pPr lvl="3"/>
             <a:r>
-              <a:rPr lang="de-DE" smtClean="0"/>
+              <a:rPr lang="de-DE"/>
               <a:t>Vierte Ebene</a:t>
             </a:r>
           </a:p>
           <a:p>
             <a:pPr lvl="4"/>
             <a:r>
-              <a:rPr lang="de-DE" smtClean="0"/>
+              <a:rPr lang="de-DE"/>
               <a:t>Fünfte Ebene</a:t>
             </a:r>
-            <a:endParaRPr lang="de-DE"/>
           </a:p>
         </p:txBody>
       </p:sp>
@@ -1523,7 +1514,7 @@
           <a:p>
             <a:pPr lvl="0"/>
             <a:r>
-              <a:rPr lang="de-DE" smtClean="0"/>
+              <a:rPr lang="de-DE"/>
               <a:t>Formatvorlagen des Textmasters bearbeiten</a:t>
             </a:r>
           </a:p>
@@ -1551,38 +1542,37 @@
           <a:p>
             <a:pPr lvl="0"/>
             <a:r>
-              <a:rPr lang="de-DE" smtClean="0"/>
+              <a:rPr lang="de-DE"/>
               <a:t>Formatvorlagen des Textmasters bearbeiten</a:t>
             </a:r>
           </a:p>
           <a:p>
             <a:pPr lvl="1"/>
             <a:r>
-              <a:rPr lang="de-DE" smtClean="0"/>
+              <a:rPr lang="de-DE"/>
               <a:t>Zweite Ebene</a:t>
             </a:r>
           </a:p>
           <a:p>
             <a:pPr lvl="2"/>
             <a:r>
-              <a:rPr lang="de-DE" smtClean="0"/>
+              <a:rPr lang="de-DE"/>
               <a:t>Dritte Ebene</a:t>
             </a:r>
           </a:p>
           <a:p>
             <a:pPr lvl="3"/>
             <a:r>
-              <a:rPr lang="de-DE" smtClean="0"/>
+              <a:rPr lang="de-DE"/>
               <a:t>Vierte Ebene</a:t>
             </a:r>
           </a:p>
           <a:p>
             <a:pPr lvl="4"/>
             <a:r>
-              <a:rPr lang="de-DE" smtClean="0"/>
+              <a:rPr lang="de-DE"/>
               <a:t>Fünfte Ebene</a:t>
             </a:r>
-            <a:endParaRPr lang="de-DE"/>
           </a:p>
         </p:txBody>
       </p:sp>
@@ -1603,7 +1593,7 @@
           <a:p>
             <a:fld id="{DD31F514-E035-4045-BF8B-8CA1E5BC6F1B}" type="datetimeFigureOut">
               <a:rPr lang="de-DE" smtClean="0"/>
-              <a:t>21.10.2022</a:t>
+              <a:t>04.02.2026</a:t>
             </a:fld>
             <a:endParaRPr lang="de-DE"/>
           </a:p>
@@ -1697,10 +1687,9 @@
           <a:lstStyle/>
           <a:p>
             <a:r>
-              <a:rPr lang="de-DE" smtClean="0"/>
+              <a:rPr lang="de-DE"/>
               <a:t>Titelmasterformat durch Klicken bearbeiten</a:t>
             </a:r>
-            <a:endParaRPr lang="de-DE"/>
           </a:p>
         </p:txBody>
       </p:sp>
@@ -1721,7 +1710,7 @@
           <a:p>
             <a:fld id="{DD31F514-E035-4045-BF8B-8CA1E5BC6F1B}" type="datetimeFigureOut">
               <a:rPr lang="de-DE" smtClean="0"/>
-              <a:t>21.10.2022</a:t>
+              <a:t>04.02.2026</a:t>
             </a:fld>
             <a:endParaRPr lang="de-DE"/>
           </a:p>
@@ -1816,7 +1805,7 @@
           <a:p>
             <a:fld id="{DD31F514-E035-4045-BF8B-8CA1E5BC6F1B}" type="datetimeFigureOut">
               <a:rPr lang="de-DE" smtClean="0"/>
-              <a:t>21.10.2022</a:t>
+              <a:t>04.02.2026</a:t>
             </a:fld>
             <a:endParaRPr lang="de-DE"/>
           </a:p>
@@ -1919,10 +1908,9 @@
           </a:lstStyle>
           <a:p>
             <a:r>
-              <a:rPr lang="de-DE" smtClean="0"/>
+              <a:rPr lang="de-DE"/>
               <a:t>Titelmasterformat durch Klicken bearbeiten</a:t>
             </a:r>
-            <a:endParaRPr lang="de-DE"/>
           </a:p>
         </p:txBody>
       </p:sp>
@@ -1976,38 +1964,37 @@
           <a:p>
             <a:pPr lvl="0"/>
             <a:r>
-              <a:rPr lang="de-DE" smtClean="0"/>
+              <a:rPr lang="de-DE"/>
               <a:t>Formatvorlagen des Textmasters bearbeiten</a:t>
             </a:r>
           </a:p>
           <a:p>
             <a:pPr lvl="1"/>
             <a:r>
-              <a:rPr lang="de-DE" smtClean="0"/>
+              <a:rPr lang="de-DE"/>
               <a:t>Zweite Ebene</a:t>
             </a:r>
           </a:p>
           <a:p>
             <a:pPr lvl="2"/>
             <a:r>
-              <a:rPr lang="de-DE" smtClean="0"/>
+              <a:rPr lang="de-DE"/>
               <a:t>Dritte Ebene</a:t>
             </a:r>
           </a:p>
           <a:p>
             <a:pPr lvl="3"/>
             <a:r>
-              <a:rPr lang="de-DE" smtClean="0"/>
+              <a:rPr lang="de-DE"/>
               <a:t>Vierte Ebene</a:t>
             </a:r>
           </a:p>
           <a:p>
             <a:pPr lvl="4"/>
             <a:r>
-              <a:rPr lang="de-DE" smtClean="0"/>
+              <a:rPr lang="de-DE"/>
               <a:t>Fünfte Ebene</a:t>
             </a:r>
-            <a:endParaRPr lang="de-DE"/>
           </a:p>
         </p:txBody>
       </p:sp>
@@ -2070,7 +2057,7 @@
           <a:p>
             <a:pPr lvl="0"/>
             <a:r>
-              <a:rPr lang="de-DE" smtClean="0"/>
+              <a:rPr lang="de-DE"/>
               <a:t>Formatvorlagen des Textmasters bearbeiten</a:t>
             </a:r>
           </a:p>
@@ -2093,7 +2080,7 @@
           <a:p>
             <a:fld id="{DD31F514-E035-4045-BF8B-8CA1E5BC6F1B}" type="datetimeFigureOut">
               <a:rPr lang="de-DE" smtClean="0"/>
-              <a:t>21.10.2022</a:t>
+              <a:t>04.02.2026</a:t>
             </a:fld>
             <a:endParaRPr lang="de-DE"/>
           </a:p>
@@ -2196,10 +2183,9 @@
           </a:lstStyle>
           <a:p>
             <a:r>
-              <a:rPr lang="de-DE" smtClean="0"/>
+              <a:rPr lang="de-DE"/>
               <a:t>Titelmasterformat durch Klicken bearbeiten</a:t>
             </a:r>
-            <a:endParaRPr lang="de-DE"/>
           </a:p>
         </p:txBody>
       </p:sp>
@@ -2323,7 +2309,7 @@
           <a:p>
             <a:pPr lvl="0"/>
             <a:r>
-              <a:rPr lang="de-DE" smtClean="0"/>
+              <a:rPr lang="de-DE"/>
               <a:t>Formatvorlagen des Textmasters bearbeiten</a:t>
             </a:r>
           </a:p>
@@ -2346,7 +2332,7 @@
           <a:p>
             <a:fld id="{DD31F514-E035-4045-BF8B-8CA1E5BC6F1B}" type="datetimeFigureOut">
               <a:rPr lang="de-DE" smtClean="0"/>
-              <a:t>21.10.2022</a:t>
+              <a:t>04.02.2026</a:t>
             </a:fld>
             <a:endParaRPr lang="de-DE"/>
           </a:p>
@@ -2455,10 +2441,9 @@
           <a:lstStyle/>
           <a:p>
             <a:r>
-              <a:rPr lang="de-DE" smtClean="0"/>
+              <a:rPr lang="de-DE"/>
               <a:t>Titelmasterformat durch Klicken bearbeiten</a:t>
             </a:r>
-            <a:endParaRPr lang="de-DE"/>
           </a:p>
         </p:txBody>
       </p:sp>
@@ -2489,38 +2474,37 @@
           <a:p>
             <a:pPr lvl="0"/>
             <a:r>
-              <a:rPr lang="de-DE" smtClean="0"/>
+              <a:rPr lang="de-DE"/>
               <a:t>Formatvorlagen des Textmasters bearbeiten</a:t>
             </a:r>
           </a:p>
           <a:p>
             <a:pPr lvl="1"/>
             <a:r>
-              <a:rPr lang="de-DE" smtClean="0"/>
+              <a:rPr lang="de-DE"/>
               <a:t>Zweite Ebene</a:t>
             </a:r>
           </a:p>
           <a:p>
             <a:pPr lvl="2"/>
             <a:r>
-              <a:rPr lang="de-DE" smtClean="0"/>
+              <a:rPr lang="de-DE"/>
               <a:t>Dritte Ebene</a:t>
             </a:r>
           </a:p>
           <a:p>
             <a:pPr lvl="3"/>
             <a:r>
-              <a:rPr lang="de-DE" smtClean="0"/>
+              <a:rPr lang="de-DE"/>
               <a:t>Vierte Ebene</a:t>
             </a:r>
           </a:p>
           <a:p>
             <a:pPr lvl="4"/>
             <a:r>
-              <a:rPr lang="de-DE" smtClean="0"/>
+              <a:rPr lang="de-DE"/>
               <a:t>Fünfte Ebene</a:t>
             </a:r>
-            <a:endParaRPr lang="de-DE"/>
           </a:p>
         </p:txBody>
       </p:sp>
@@ -2559,7 +2543,7 @@
           <a:p>
             <a:fld id="{DD31F514-E035-4045-BF8B-8CA1E5BC6F1B}" type="datetimeFigureOut">
               <a:rPr lang="de-DE" smtClean="0"/>
-              <a:t>21.10.2022</a:t>
+              <a:t>04.02.2026</a:t>
             </a:fld>
             <a:endParaRPr lang="de-DE"/>
           </a:p>
@@ -3442,14 +3426,13 @@
           <a:p>
             <a:pPr algn="ctr"/>
             <a:r>
-              <a:rPr lang="de-DE" sz="2800" dirty="0" smtClean="0"/>
+              <a:rPr lang="de-DE" sz="2800" dirty="0"/>
               <a:t>T</a:t>
             </a:r>
             <a:r>
-              <a:rPr lang="de-DE" sz="2800" baseline="-25000" dirty="0" smtClean="0"/>
-              <a:t>amb</a:t>
-            </a:r>
-            <a:endParaRPr lang="de-DE" sz="2800" baseline="-25000" dirty="0"/>
+              <a:rPr lang="de-DE" sz="2800" baseline="-25000" dirty="0"/>
+              <a:t>air</a:t>
+            </a:r>
           </a:p>
         </p:txBody>
       </p:sp>
@@ -3477,14 +3460,13 @@
           <a:p>
             <a:pPr algn="ctr"/>
             <a:r>
-              <a:rPr lang="de-DE" sz="2800" dirty="0" smtClean="0"/>
+              <a:rPr lang="de-DE" sz="2800" dirty="0"/>
               <a:t>T</a:t>
             </a:r>
             <a:r>
-              <a:rPr lang="de-DE" sz="2800" baseline="-25000" dirty="0" smtClean="0"/>
+              <a:rPr lang="de-DE" sz="2800" baseline="-25000" dirty="0"/>
               <a:t>ground</a:t>
             </a:r>
-            <a:endParaRPr lang="de-DE" sz="2800" baseline="-25000" dirty="0"/>
           </a:p>
         </p:txBody>
       </p:sp>
@@ -3512,7 +3494,7 @@
           <a:p>
             <a:pPr algn="ctr"/>
             <a:r>
-              <a:rPr lang="de-DE" sz="2800" dirty="0" smtClean="0">
+              <a:rPr lang="de-DE" sz="2800" dirty="0">
                 <a:solidFill>
                   <a:schemeClr val="accent6">
                     <a:lumMod val="75000"/>
@@ -3522,7 +3504,7 @@
               <a:t>A</a:t>
             </a:r>
             <a:r>
-              <a:rPr lang="de-DE" sz="2800" baseline="-25000" dirty="0" smtClean="0">
+              <a:rPr lang="de-DE" sz="2800" baseline="-25000" dirty="0">
                 <a:solidFill>
                   <a:schemeClr val="accent6">
                     <a:lumMod val="75000"/>
@@ -3532,7 +3514,7 @@
               <a:t>bottom</a:t>
             </a:r>
             <a:r>
-              <a:rPr lang="de-DE" sz="2800" dirty="0" smtClean="0">
+              <a:rPr lang="de-DE" sz="2800" dirty="0">
                 <a:solidFill>
                   <a:schemeClr val="accent6">
                     <a:lumMod val="75000"/>
@@ -3542,7 +3524,7 @@
               <a:t>, U</a:t>
             </a:r>
             <a:r>
-              <a:rPr lang="de-DE" sz="2800" baseline="-25000" dirty="0" smtClean="0">
+              <a:rPr lang="de-DE" sz="2800" baseline="-25000" dirty="0">
                 <a:solidFill>
                   <a:schemeClr val="accent6">
                     <a:lumMod val="75000"/>
@@ -3551,13 +3533,6 @@
               </a:rPr>
               <a:t>bottom</a:t>
             </a:r>
-            <a:endParaRPr lang="de-DE" sz="2800" baseline="-25000" dirty="0">
-              <a:solidFill>
-                <a:schemeClr val="accent6">
-                  <a:lumMod val="75000"/>
-                </a:schemeClr>
-              </a:solidFill>
-            </a:endParaRPr>
           </a:p>
         </p:txBody>
       </p:sp>
@@ -3585,22 +3560,21 @@
           <a:p>
             <a:pPr algn="ctr"/>
             <a:r>
-              <a:rPr lang="de-DE" sz="2800" dirty="0" smtClean="0"/>
+              <a:rPr lang="de-DE" sz="2800" dirty="0"/>
               <a:t>T</a:t>
             </a:r>
             <a:r>
-              <a:rPr lang="de-DE" sz="2800" baseline="-25000" dirty="0" smtClean="0"/>
+              <a:rPr lang="de-DE" sz="2800" baseline="-25000" dirty="0"/>
               <a:t>n</a:t>
             </a:r>
             <a:r>
-              <a:rPr lang="de-DE" sz="2800" dirty="0" smtClean="0"/>
+              <a:rPr lang="de-DE" sz="2800" dirty="0"/>
               <a:t>, V</a:t>
             </a:r>
             <a:r>
-              <a:rPr lang="de-DE" sz="2800" baseline="-25000" dirty="0" smtClean="0"/>
+              <a:rPr lang="de-DE" sz="2800" baseline="-25000" dirty="0"/>
               <a:t>n</a:t>
             </a:r>
-            <a:endParaRPr lang="de-DE" sz="2800" baseline="-25000" dirty="0"/>
           </a:p>
         </p:txBody>
       </p:sp>
@@ -3628,26 +3602,21 @@
           <a:p>
             <a:pPr algn="ctr"/>
             <a:r>
-              <a:rPr lang="de-DE" sz="2800" dirty="0" smtClean="0"/>
+              <a:rPr lang="de-DE" sz="2800" dirty="0"/>
               <a:t>T</a:t>
             </a:r>
             <a:r>
-              <a:rPr lang="de-DE" sz="2800" baseline="-25000" dirty="0" smtClean="0"/>
+              <a:rPr lang="de-DE" sz="2800" baseline="-25000" dirty="0"/>
               <a:t>1</a:t>
             </a:r>
             <a:r>
-              <a:rPr lang="de-DE" sz="2800" dirty="0" smtClean="0"/>
-              <a:t>, </a:t>
-            </a:r>
-            <a:r>
               <a:rPr lang="de-DE" sz="2800" dirty="0"/>
-              <a:t>V</a:t>
-            </a:r>
-            <a:r>
-              <a:rPr lang="de-DE" sz="2800" baseline="-25000" dirty="0" smtClean="0"/>
+              <a:t>, V</a:t>
+            </a:r>
+            <a:r>
+              <a:rPr lang="de-DE" sz="2800" baseline="-25000" dirty="0"/>
               <a:t>1</a:t>
             </a:r>
-            <a:endParaRPr lang="de-DE" sz="2800" baseline="-25000" dirty="0"/>
           </a:p>
         </p:txBody>
       </p:sp>
@@ -3712,7 +3681,7 @@
           <a:p>
             <a:pPr algn="ctr"/>
             <a:r>
-              <a:rPr lang="de-DE" sz="2800" dirty="0" smtClean="0">
+              <a:rPr lang="de-DE" sz="2800" dirty="0">
                 <a:solidFill>
                   <a:schemeClr val="accent2">
                     <a:lumMod val="75000"/>
@@ -3722,7 +3691,7 @@
               <a:t>A</a:t>
             </a:r>
             <a:r>
-              <a:rPr lang="de-DE" sz="2800" baseline="-25000" dirty="0" smtClean="0">
+              <a:rPr lang="de-DE" sz="2800" baseline="-25000" dirty="0">
                 <a:solidFill>
                   <a:schemeClr val="accent2">
                     <a:lumMod val="75000"/>
@@ -3732,7 +3701,7 @@
               <a:t>lid</a:t>
             </a:r>
             <a:r>
-              <a:rPr lang="de-DE" sz="2800" dirty="0" smtClean="0">
+              <a:rPr lang="de-DE" sz="2800" dirty="0">
                 <a:solidFill>
                   <a:schemeClr val="accent2">
                     <a:lumMod val="75000"/>
@@ -3742,7 +3711,7 @@
               <a:t>,</a:t>
             </a:r>
             <a:r>
-              <a:rPr lang="de-DE" sz="2800" baseline="-25000" dirty="0" smtClean="0">
+              <a:rPr lang="de-DE" sz="2800" baseline="-25000" dirty="0">
                 <a:solidFill>
                   <a:schemeClr val="accent2">
                     <a:lumMod val="75000"/>
@@ -3752,7 +3721,7 @@
               <a:t> </a:t>
             </a:r>
             <a:r>
-              <a:rPr lang="de-DE" sz="2800" dirty="0" smtClean="0">
+              <a:rPr lang="de-DE" sz="2800" dirty="0">
                 <a:solidFill>
                   <a:schemeClr val="accent2">
                     <a:lumMod val="75000"/>
@@ -3762,7 +3731,7 @@
               <a:t>U</a:t>
             </a:r>
             <a:r>
-              <a:rPr lang="de-DE" sz="2800" baseline="-25000" dirty="0" smtClean="0">
+              <a:rPr lang="de-DE" sz="2800" baseline="-25000" dirty="0">
                 <a:solidFill>
                   <a:schemeClr val="accent2">
                     <a:lumMod val="75000"/>
@@ -3771,18 +3740,11 @@
               </a:rPr>
               <a:t>lid</a:t>
             </a:r>
-            <a:endParaRPr lang="de-DE" sz="2800" baseline="-25000" dirty="0">
-              <a:solidFill>
-                <a:schemeClr val="accent2">
-                  <a:lumMod val="75000"/>
-                </a:schemeClr>
-              </a:solidFill>
-            </a:endParaRPr>
-          </a:p>
-        </p:txBody>
-      </p:sp>
-      <mc:AlternateContent xmlns:mc="http://schemas.openxmlformats.org/markup-compatibility/2006" xmlns:a14="http://schemas.microsoft.com/office/drawing/2010/main">
-        <mc:Choice Requires="a14">
+          </a:p>
+        </p:txBody>
+      </p:sp>
+      <mc:AlternateContent xmlns:mc="http://schemas.openxmlformats.org/markup-compatibility/2006">
+        <mc:Choice xmlns:a14="http://schemas.microsoft.com/office/drawing/2010/main" Requires="a14">
           <p:sp>
             <p:nvSpPr>
               <p:cNvPr id="41" name="Textfeld 40"/>
@@ -3839,27 +3801,20 @@
                   </m:oMath>
                 </a14:m>
                 <a:r>
-                  <a:rPr lang="de-DE" sz="2800" baseline="-25000" dirty="0" smtClean="0">
+                  <a:rPr lang="de-DE" sz="2800" baseline="-25000" dirty="0">
                     <a:solidFill>
                       <a:schemeClr val="accent2">
                         <a:lumMod val="75000"/>
                       </a:schemeClr>
                     </a:solidFill>
                   </a:rPr>
-                  <a:t>loss,n,amb</a:t>
+                  <a:t>loss,n,air</a:t>
                 </a:r>
-                <a:endParaRPr lang="de-DE" sz="2800" baseline="-25000" dirty="0">
-                  <a:solidFill>
-                    <a:schemeClr val="accent2">
-                      <a:lumMod val="75000"/>
-                    </a:schemeClr>
-                  </a:solidFill>
-                </a:endParaRPr>
               </a:p>
             </p:txBody>
           </p:sp>
         </mc:Choice>
-        <mc:Fallback xmlns="">
+        <mc:Fallback>
           <p:sp>
             <p:nvSpPr>
               <p:cNvPr id="41" name="Textfeld 40"/>
@@ -3877,7 +3832,7 @@
                 <a:avLst/>
               </a:prstGeom>
               <a:blipFill>
-                <a:blip r:embed="rId22"/>
+                <a:blip r:embed="rId4"/>
                 <a:stretch>
                   <a:fillRect b="-30337"/>
                 </a:stretch>
@@ -3898,8 +3853,8 @@
           </p:sp>
         </mc:Fallback>
       </mc:AlternateContent>
-      <mc:AlternateContent xmlns:mc="http://schemas.openxmlformats.org/markup-compatibility/2006">
-        <mc:Choice xmlns:a14="http://schemas.microsoft.com/office/drawing/2010/main" Requires="a14">
+      <mc:AlternateContent xmlns:mc="http://schemas.openxmlformats.org/markup-compatibility/2006" xmlns:a14="http://schemas.microsoft.com/office/drawing/2010/main">
+        <mc:Choice Requires="a14">
           <p:sp>
             <p:nvSpPr>
               <p:cNvPr id="42" name="Textfeld 41"/>
@@ -3956,7 +3911,7 @@
                   </m:oMath>
                 </a14:m>
                 <a:r>
-                  <a:rPr lang="de-DE" sz="2800" baseline="-25000" dirty="0" smtClean="0">
+                  <a:rPr lang="de-DE" sz="2800" baseline="-25000" dirty="0">
                     <a:solidFill>
                       <a:schemeClr val="bg2">
                         <a:lumMod val="50000"/>
@@ -3965,18 +3920,11 @@
                   </a:rPr>
                   <a:t>loss,n,wall</a:t>
                 </a:r>
-                <a:endParaRPr lang="de-DE" sz="2800" baseline="-25000" dirty="0">
-                  <a:solidFill>
-                    <a:schemeClr val="bg2">
-                      <a:lumMod val="50000"/>
-                    </a:schemeClr>
-                  </a:solidFill>
-                </a:endParaRPr>
               </a:p>
             </p:txBody>
           </p:sp>
         </mc:Choice>
-        <mc:Fallback>
+        <mc:Fallback xmlns="">
           <p:sp>
             <p:nvSpPr>
               <p:cNvPr id="42" name="Textfeld 41"/>
@@ -4015,8 +3963,8 @@
           </p:sp>
         </mc:Fallback>
       </mc:AlternateContent>
-      <mc:AlternateContent xmlns:mc="http://schemas.openxmlformats.org/markup-compatibility/2006">
-        <mc:Choice xmlns:a14="http://schemas.microsoft.com/office/drawing/2010/main" Requires="a14">
+      <mc:AlternateContent xmlns:mc="http://schemas.openxmlformats.org/markup-compatibility/2006" xmlns:a14="http://schemas.microsoft.com/office/drawing/2010/main">
+        <mc:Choice Requires="a14">
           <p:sp>
             <p:nvSpPr>
               <p:cNvPr id="43" name="Textfeld 42"/>
@@ -4073,7 +4021,7 @@
                   </m:oMath>
                 </a14:m>
                 <a:r>
-                  <a:rPr lang="de-DE" sz="2800" baseline="-25000" dirty="0" smtClean="0">
+                  <a:rPr lang="de-DE" sz="2800" baseline="-25000" dirty="0">
                     <a:solidFill>
                       <a:schemeClr val="accent6">
                         <a:lumMod val="75000"/>
@@ -4082,18 +4030,11 @@
                   </a:rPr>
                   <a:t>loss,1,bottom</a:t>
                 </a:r>
-                <a:endParaRPr lang="de-DE" sz="2800" baseline="-25000" dirty="0">
-                  <a:solidFill>
-                    <a:schemeClr val="accent6">
-                      <a:lumMod val="75000"/>
-                    </a:schemeClr>
-                  </a:solidFill>
-                </a:endParaRPr>
               </a:p>
             </p:txBody>
           </p:sp>
         </mc:Choice>
-        <mc:Fallback>
+        <mc:Fallback xmlns="">
           <p:sp>
             <p:nvSpPr>
               <p:cNvPr id="43" name="Textfeld 42"/>
@@ -4311,7 +4252,7 @@
                   </m:oMath>
                 </a14:m>
                 <a:r>
-                  <a:rPr lang="de-DE" sz="2800" baseline="-25000" dirty="0" smtClean="0"/>
+                  <a:rPr lang="de-DE" sz="2800" baseline="-25000" dirty="0"/>
                   <a:t>out</a:t>
                 </a:r>
                 <a14:m>
@@ -4343,10 +4284,9 @@
                   </m:oMath>
                 </a14:m>
                 <a:r>
-                  <a:rPr lang="de-DE" sz="2800" baseline="-25000" dirty="0" smtClean="0"/>
+                  <a:rPr lang="de-DE" sz="2800" baseline="-25000" dirty="0"/>
                   <a:t>out</a:t>
                 </a:r>
-                <a:endParaRPr lang="de-DE" sz="2800" baseline="-25000" dirty="0"/>
               </a:p>
               <a:p>
                 <a:pPr algn="ctr"/>
@@ -4442,7 +4382,7 @@
                   </m:oMath>
                 </a14:m>
                 <a:r>
-                  <a:rPr lang="de-DE" sz="2800" baseline="-25000" dirty="0" smtClean="0"/>
+                  <a:rPr lang="de-DE" sz="2800" baseline="-25000" dirty="0"/>
                   <a:t>in</a:t>
                 </a:r>
                 <a14:m>
@@ -4883,7 +4823,7 @@
           <a:p>
             <a:pPr algn="ctr"/>
             <a:r>
-              <a:rPr lang="de-DE" sz="2800" dirty="0" smtClean="0">
+              <a:rPr lang="de-DE" sz="2800" dirty="0">
                 <a:solidFill>
                   <a:schemeClr val="bg2">
                     <a:lumMod val="50000"/>
@@ -4893,7 +4833,7 @@
               <a:t>A</a:t>
             </a:r>
             <a:r>
-              <a:rPr lang="de-DE" sz="2800" baseline="-25000" dirty="0" smtClean="0">
+              <a:rPr lang="de-DE" sz="2800" baseline="-25000" dirty="0">
                 <a:solidFill>
                   <a:schemeClr val="bg2">
                     <a:lumMod val="50000"/>
@@ -4903,7 +4843,7 @@
               <a:t>wall </a:t>
             </a:r>
             <a:r>
-              <a:rPr lang="de-DE" sz="2800" dirty="0" smtClean="0">
+              <a:rPr lang="de-DE" sz="2800" dirty="0">
                 <a:solidFill>
                   <a:schemeClr val="bg2">
                     <a:lumMod val="50000"/>
@@ -4916,7 +4856,7 @@
           <a:p>
             <a:pPr algn="ctr"/>
             <a:r>
-              <a:rPr lang="de-DE" sz="2800" dirty="0" smtClean="0">
+              <a:rPr lang="de-DE" sz="2800" dirty="0">
                 <a:solidFill>
                   <a:schemeClr val="bg2">
                     <a:lumMod val="50000"/>
@@ -4926,7 +4866,7 @@
               <a:t>U</a:t>
             </a:r>
             <a:r>
-              <a:rPr lang="de-DE" sz="2800" baseline="-25000" dirty="0" smtClean="0">
+              <a:rPr lang="de-DE" sz="2800" baseline="-25000" dirty="0">
                 <a:solidFill>
                   <a:schemeClr val="bg2">
                     <a:lumMod val="50000"/>
@@ -4936,16 +4876,6 @@
               <a:t>wall</a:t>
             </a:r>
             <a:r>
-              <a:rPr lang="de-DE" sz="2800" dirty="0" smtClean="0">
-                <a:solidFill>
-                  <a:schemeClr val="bg2">
-                    <a:lumMod val="50000"/>
-                  </a:schemeClr>
-                </a:solidFill>
-              </a:rPr>
-              <a:t>(n</a:t>
-            </a:r>
-            <a:r>
               <a:rPr lang="de-DE" sz="2800" dirty="0">
                 <a:solidFill>
                   <a:schemeClr val="bg2">
@@ -4953,7 +4883,7 @@
                   </a:schemeClr>
                 </a:solidFill>
               </a:rPr>
-              <a:t>)</a:t>
+              <a:t>(n)</a:t>
             </a:r>
             <a:endParaRPr lang="de-DE" sz="2800" baseline="-25000" dirty="0">
               <a:solidFill>
@@ -4965,8 +4895,8 @@
           </a:p>
         </p:txBody>
       </p:sp>
-      <mc:AlternateContent xmlns:mc="http://schemas.openxmlformats.org/markup-compatibility/2006">
-        <mc:Choice xmlns:a14="http://schemas.microsoft.com/office/drawing/2010/main" Requires="a14">
+      <mc:AlternateContent xmlns:mc="http://schemas.openxmlformats.org/markup-compatibility/2006" xmlns:a14="http://schemas.microsoft.com/office/drawing/2010/main">
+        <mc:Choice Requires="a14">
           <p:sp>
             <p:nvSpPr>
               <p:cNvPr id="67" name="Textfeld 66"/>
@@ -5023,7 +4953,7 @@
                   </m:oMath>
                 </a14:m>
                 <a:r>
-                  <a:rPr lang="de-DE" sz="2800" baseline="-25000" dirty="0" smtClean="0">
+                  <a:rPr lang="de-DE" sz="2800" baseline="-25000" dirty="0">
                     <a:solidFill>
                       <a:schemeClr val="bg2">
                         <a:lumMod val="50000"/>
@@ -5032,18 +4962,11 @@
                   </a:rPr>
                   <a:t>loss,1,wall</a:t>
                 </a:r>
-                <a:endParaRPr lang="de-DE" sz="2800" baseline="-25000" dirty="0">
-                  <a:solidFill>
-                    <a:schemeClr val="bg2">
-                      <a:lumMod val="50000"/>
-                    </a:schemeClr>
-                  </a:solidFill>
-                </a:endParaRPr>
               </a:p>
             </p:txBody>
           </p:sp>
         </mc:Choice>
-        <mc:Fallback>
+        <mc:Fallback xmlns="">
           <p:sp>
             <p:nvSpPr>
               <p:cNvPr id="67" name="Textfeld 66"/>
@@ -5188,8 +5111,8 @@
           </a:prstGeom>
         </p:spPr>
       </p:pic>
-      <mc:AlternateContent xmlns:mc="http://schemas.openxmlformats.org/markup-compatibility/2006">
-        <mc:Choice xmlns:a14="http://schemas.microsoft.com/office/drawing/2010/main" Requires="a14">
+      <mc:AlternateContent xmlns:mc="http://schemas.openxmlformats.org/markup-compatibility/2006" xmlns:a14="http://schemas.microsoft.com/office/drawing/2010/main">
+        <mc:Choice Requires="a14">
           <p:sp>
             <p:nvSpPr>
               <p:cNvPr id="47" name="Textfeld 46"/>
@@ -5246,7 +5169,7 @@
                   </m:oMath>
                 </a14:m>
                 <a:r>
-                  <a:rPr lang="de-DE" sz="2800" baseline="-25000" dirty="0" smtClean="0">
+                  <a:rPr lang="de-DE" sz="2800" baseline="-25000" dirty="0">
                     <a:solidFill>
                       <a:schemeClr val="bg2">
                         <a:lumMod val="50000"/>
@@ -5255,18 +5178,11 @@
                   </a:rPr>
                   <a:t>loss,n-1,wall</a:t>
                 </a:r>
-                <a:endParaRPr lang="de-DE" sz="2800" baseline="-25000" dirty="0">
-                  <a:solidFill>
-                    <a:schemeClr val="bg2">
-                      <a:lumMod val="50000"/>
-                    </a:schemeClr>
-                  </a:solidFill>
-                </a:endParaRPr>
               </a:p>
             </p:txBody>
           </p:sp>
         </mc:Choice>
-        <mc:Fallback>
+        <mc:Fallback xmlns="">
           <p:sp>
             <p:nvSpPr>
               <p:cNvPr id="47" name="Textfeld 46"/>
@@ -5329,22 +5245,21 @@
           <a:p>
             <a:pPr algn="ctr"/>
             <a:r>
-              <a:rPr lang="de-DE" sz="2800" dirty="0" smtClean="0"/>
+              <a:rPr lang="de-DE" sz="2800" dirty="0"/>
               <a:t>T</a:t>
             </a:r>
             <a:r>
-              <a:rPr lang="de-DE" sz="2800" baseline="-25000" dirty="0" smtClean="0"/>
+              <a:rPr lang="de-DE" sz="2800" baseline="-25000" dirty="0"/>
               <a:t>n-1</a:t>
             </a:r>
             <a:r>
-              <a:rPr lang="de-DE" sz="2800" dirty="0" smtClean="0"/>
+              <a:rPr lang="de-DE" sz="2800" dirty="0"/>
               <a:t>, V</a:t>
             </a:r>
             <a:r>
-              <a:rPr lang="de-DE" sz="2800" baseline="-25000" dirty="0" smtClean="0"/>
+              <a:rPr lang="de-DE" sz="2800" baseline="-25000" dirty="0"/>
               <a:t>n-1</a:t>
             </a:r>
-            <a:endParaRPr lang="de-DE" sz="2800" baseline="-25000" dirty="0"/>
           </a:p>
         </p:txBody>
       </p:sp>
@@ -5422,8 +5337,8 @@
           </a:fontRef>
         </p:style>
       </p:cxnSp>
-      <mc:AlternateContent xmlns:mc="http://schemas.openxmlformats.org/markup-compatibility/2006">
-        <mc:Choice xmlns:a14="http://schemas.microsoft.com/office/drawing/2010/main" Requires="a14">
+      <mc:AlternateContent xmlns:mc="http://schemas.openxmlformats.org/markup-compatibility/2006" xmlns:a14="http://schemas.microsoft.com/office/drawing/2010/main">
+        <mc:Choice Requires="a14">
           <p:sp>
             <p:nvSpPr>
               <p:cNvPr id="58" name="Textfeld 57"/>
@@ -5470,19 +5385,14 @@
                   </m:oMath>
                 </a14:m>
                 <a:r>
-                  <a:rPr lang="de-DE" sz="2800" baseline="-25000" dirty="0" smtClean="0"/>
-                  <a:t>diffus</a:t>
+                  <a:rPr lang="de-DE" sz="2800" baseline="-25000" dirty="0"/>
+                  <a:t>diffus., n:n-1</a:t>
                 </a:r>
-                <a:r>
-                  <a:rPr lang="de-DE" sz="2800" baseline="-25000" dirty="0" smtClean="0"/>
-                  <a:t>., n:n-1</a:t>
-                </a:r>
-                <a:endParaRPr lang="de-DE" sz="2800" baseline="-25000" dirty="0"/>
               </a:p>
             </p:txBody>
           </p:sp>
         </mc:Choice>
-        <mc:Fallback>
+        <mc:Fallback xmlns="">
           <p:sp>
             <p:nvSpPr>
               <p:cNvPr id="58" name="Textfeld 57"/>
@@ -5521,8 +5431,8 @@
           </p:sp>
         </mc:Fallback>
       </mc:AlternateContent>
-      <mc:AlternateContent xmlns:mc="http://schemas.openxmlformats.org/markup-compatibility/2006">
-        <mc:Choice xmlns:a14="http://schemas.microsoft.com/office/drawing/2010/main" Requires="a14">
+      <mc:AlternateContent xmlns:mc="http://schemas.openxmlformats.org/markup-compatibility/2006" xmlns:a14="http://schemas.microsoft.com/office/drawing/2010/main">
+        <mc:Choice Requires="a14">
           <p:sp>
             <p:nvSpPr>
               <p:cNvPr id="61" name="Textfeld 60"/>
@@ -5569,19 +5479,14 @@
                   </m:oMath>
                 </a14:m>
                 <a:r>
-                  <a:rPr lang="de-DE" sz="2800" baseline="-25000" dirty="0" smtClean="0"/>
-                  <a:t>diffus</a:t>
+                  <a:rPr lang="de-DE" sz="2800" baseline="-25000" dirty="0"/>
+                  <a:t>diffus., n-1:1</a:t>
                 </a:r>
-                <a:r>
-                  <a:rPr lang="de-DE" sz="2800" baseline="-25000" dirty="0" smtClean="0"/>
-                  <a:t>., n-1:1</a:t>
-                </a:r>
-                <a:endParaRPr lang="de-DE" sz="2800" baseline="-25000" dirty="0"/>
               </a:p>
             </p:txBody>
           </p:sp>
         </mc:Choice>
-        <mc:Fallback>
+        <mc:Fallback xmlns="">
           <p:sp>
             <p:nvSpPr>
               <p:cNvPr id="61" name="Textfeld 60"/>
@@ -5620,8 +5525,8 @@
           </p:sp>
         </mc:Fallback>
       </mc:AlternateContent>
-      <mc:AlternateContent xmlns:mc="http://schemas.openxmlformats.org/markup-compatibility/2006">
-        <mc:Choice xmlns:a14="http://schemas.microsoft.com/office/drawing/2010/main" Requires="a14">
+      <mc:AlternateContent xmlns:mc="http://schemas.openxmlformats.org/markup-compatibility/2006" xmlns:a14="http://schemas.microsoft.com/office/drawing/2010/main">
+        <mc:Choice Requires="a14">
           <p:sp>
             <p:nvSpPr>
               <p:cNvPr id="63" name="Textfeld 62"/>
@@ -5668,19 +5573,14 @@
                   </m:oMath>
                 </a14:m>
                 <a:r>
-                  <a:rPr lang="de-DE" sz="2800" baseline="-25000" dirty="0" smtClean="0"/>
-                  <a:t>buoy., </a:t>
+                  <a:rPr lang="de-DE" sz="2800" baseline="-25000" dirty="0"/>
+                  <a:t>buoy., n:n-1</a:t>
                 </a:r>
-                <a:r>
-                  <a:rPr lang="de-DE" sz="2800" baseline="-25000" dirty="0" smtClean="0"/>
-                  <a:t>n:n-1</a:t>
-                </a:r>
-                <a:endParaRPr lang="de-DE" sz="2800" baseline="-25000" dirty="0"/>
               </a:p>
             </p:txBody>
           </p:sp>
         </mc:Choice>
-        <mc:Fallback>
+        <mc:Fallback xmlns="">
           <p:sp>
             <p:nvSpPr>
               <p:cNvPr id="63" name="Textfeld 62"/>
@@ -5719,8 +5619,8 @@
           </p:sp>
         </mc:Fallback>
       </mc:AlternateContent>
-      <mc:AlternateContent xmlns:mc="http://schemas.openxmlformats.org/markup-compatibility/2006">
-        <mc:Choice xmlns:a14="http://schemas.microsoft.com/office/drawing/2010/main" Requires="a14">
+      <mc:AlternateContent xmlns:mc="http://schemas.openxmlformats.org/markup-compatibility/2006" xmlns:a14="http://schemas.microsoft.com/office/drawing/2010/main">
+        <mc:Choice Requires="a14">
           <p:sp>
             <p:nvSpPr>
               <p:cNvPr id="64" name="Textfeld 63"/>
@@ -5767,19 +5667,14 @@
                   </m:oMath>
                 </a14:m>
                 <a:r>
-                  <a:rPr lang="de-DE" sz="2800" baseline="-25000" dirty="0" smtClean="0"/>
-                  <a:t>buoy., </a:t>
+                  <a:rPr lang="de-DE" sz="2800" baseline="-25000" dirty="0"/>
+                  <a:t>buoy., n-1:1</a:t>
                 </a:r>
-                <a:r>
-                  <a:rPr lang="de-DE" sz="2800" baseline="-25000" dirty="0" smtClean="0"/>
-                  <a:t>n-1:1</a:t>
-                </a:r>
-                <a:endParaRPr lang="de-DE" sz="2800" baseline="-25000" dirty="0"/>
               </a:p>
             </p:txBody>
           </p:sp>
         </mc:Choice>
-        <mc:Fallback>
+        <mc:Fallback xmlns="">
           <p:sp>
             <p:nvSpPr>
               <p:cNvPr id="64" name="Textfeld 63"/>

</xml_diff>